<commit_message>
final (?) round of tweaks
</commit_message>
<xml_diff>
--- a/old_pipeline_2.pptx
+++ b/old_pipeline_2.pptx
@@ -104,6 +104,11 @@
       </a:defRPr>
     </a:lvl9pPr>
   </p:defaultTextStyle>
+  <p:extLst>
+    <p:ext uri="{EFAFB233-063F-42B5-8137-9DF3F51BA10A}">
+      <p15:sldGuideLst xmlns:p15="http://schemas.microsoft.com/office/powerpoint/2012/main"/>
+    </p:ext>
+  </p:extLst>
 </p:presentation>
 </file>
 
@@ -235,7 +240,7 @@
           <a:lstStyle/>
           <a:p>
             <a:fld id="{3391B229-5FC3-884E-B910-9967CFDB0038}" type="datetimeFigureOut">
-              <a:t>2/27/17</a:t>
+              <a:t>3/15/17</a:t>
             </a:fld>
             <a:endParaRPr lang="en-US"/>
           </a:p>
@@ -401,7 +406,7 @@
           <a:lstStyle/>
           <a:p>
             <a:fld id="{3391B229-5FC3-884E-B910-9967CFDB0038}" type="datetimeFigureOut">
-              <a:t>2/27/17</a:t>
+              <a:t>3/15/17</a:t>
             </a:fld>
             <a:endParaRPr lang="en-US"/>
           </a:p>
@@ -577,7 +582,7 @@
           <a:lstStyle/>
           <a:p>
             <a:fld id="{3391B229-5FC3-884E-B910-9967CFDB0038}" type="datetimeFigureOut">
-              <a:t>2/27/17</a:t>
+              <a:t>3/15/17</a:t>
             </a:fld>
             <a:endParaRPr lang="en-US"/>
           </a:p>
@@ -743,7 +748,7 @@
           <a:lstStyle/>
           <a:p>
             <a:fld id="{3391B229-5FC3-884E-B910-9967CFDB0038}" type="datetimeFigureOut">
-              <a:t>2/27/17</a:t>
+              <a:t>3/15/17</a:t>
             </a:fld>
             <a:endParaRPr lang="en-US"/>
           </a:p>
@@ -986,7 +991,7 @@
           <a:lstStyle/>
           <a:p>
             <a:fld id="{3391B229-5FC3-884E-B910-9967CFDB0038}" type="datetimeFigureOut">
-              <a:t>2/27/17</a:t>
+              <a:t>3/15/17</a:t>
             </a:fld>
             <a:endParaRPr lang="en-US"/>
           </a:p>
@@ -1213,7 +1218,7 @@
           <a:lstStyle/>
           <a:p>
             <a:fld id="{3391B229-5FC3-884E-B910-9967CFDB0038}" type="datetimeFigureOut">
-              <a:t>2/27/17</a:t>
+              <a:t>3/15/17</a:t>
             </a:fld>
             <a:endParaRPr lang="en-US"/>
           </a:p>
@@ -1575,7 +1580,7 @@
           <a:lstStyle/>
           <a:p>
             <a:fld id="{3391B229-5FC3-884E-B910-9967CFDB0038}" type="datetimeFigureOut">
-              <a:t>2/27/17</a:t>
+              <a:t>3/15/17</a:t>
             </a:fld>
             <a:endParaRPr lang="en-US"/>
           </a:p>
@@ -1690,7 +1695,7 @@
           <a:lstStyle/>
           <a:p>
             <a:fld id="{3391B229-5FC3-884E-B910-9967CFDB0038}" type="datetimeFigureOut">
-              <a:t>2/27/17</a:t>
+              <a:t>3/15/17</a:t>
             </a:fld>
             <a:endParaRPr lang="en-US"/>
           </a:p>
@@ -1783,7 +1788,7 @@
           <a:lstStyle/>
           <a:p>
             <a:fld id="{3391B229-5FC3-884E-B910-9967CFDB0038}" type="datetimeFigureOut">
-              <a:t>2/27/17</a:t>
+              <a:t>3/15/17</a:t>
             </a:fld>
             <a:endParaRPr lang="en-US"/>
           </a:p>
@@ -2056,7 +2061,7 @@
           <a:lstStyle/>
           <a:p>
             <a:fld id="{3391B229-5FC3-884E-B910-9967CFDB0038}" type="datetimeFigureOut">
-              <a:t>2/27/17</a:t>
+              <a:t>3/15/17</a:t>
             </a:fld>
             <a:endParaRPr lang="en-US"/>
           </a:p>
@@ -2306,7 +2311,7 @@
           <a:lstStyle/>
           <a:p>
             <a:fld id="{3391B229-5FC3-884E-B910-9967CFDB0038}" type="datetimeFigureOut">
-              <a:t>2/27/17</a:t>
+              <a:t>3/15/17</a:t>
             </a:fld>
             <a:endParaRPr lang="en-US"/>
           </a:p>
@@ -2515,7 +2520,7 @@
           </a:lstStyle>
           <a:p>
             <a:fld id="{3391B229-5FC3-884E-B910-9967CFDB0038}" type="datetimeFigureOut">
-              <a:t>2/27/17</a:t>
+              <a:t>3/15/17</a:t>
             </a:fld>
             <a:endParaRPr lang="en-US"/>
           </a:p>
@@ -3956,6 +3961,30 @@
           </a:fontRef>
         </p:style>
       </p:cxnSp>
+      <p:pic>
+        <p:nvPicPr>
+          <p:cNvPr id="2" name="Picture 1"/>
+          <p:cNvPicPr>
+            <a:picLocks noChangeAspect="1"/>
+          </p:cNvPicPr>
+          <p:nvPr/>
+        </p:nvPicPr>
+        <p:blipFill>
+          <a:blip r:embed="rId10"/>
+          <a:stretch>
+            <a:fillRect/>
+          </a:stretch>
+        </p:blipFill>
+        <p:spPr>
+          <a:xfrm>
+            <a:off x="4335034" y="114986"/>
+            <a:ext cx="3175000" cy="381000"/>
+          </a:xfrm>
+          <a:prstGeom prst="rect">
+            <a:avLst/>
+          </a:prstGeom>
+        </p:spPr>
+      </p:pic>
     </p:spTree>
     <p:extLst>
       <p:ext uri="{BB962C8B-B14F-4D97-AF65-F5344CB8AC3E}">

</xml_diff>